<commit_message>
Implementation Guidance page (#290)
Added rich content to implementation guidance page.

---------

Signed-off-by: Steven Capell <onthebreeze@users.noreply.github.com>
Co-authored-by: Michael Nelson <absoludity@gmail.com>
</commit_message>
<xml_diff>
--- a/website/docs/about/UNTP-Diagrams-About.pptx
+++ b/website/docs/about/UNTP-Diagrams-About.pptx
@@ -246,7 +246,7 @@
           <a:p>
             <a:fld id="{147FDE8E-C9EA-4A43-8789-DFF19C510078}" type="datetimeFigureOut">
               <a:rPr lang="en-US" smtClean="0"/>
-              <a:t>1/29/25</a:t>
+              <a:t>2/4/25</a:t>
             </a:fld>
             <a:endParaRPr lang="en-US"/>
           </a:p>
@@ -1825,7 +1825,7 @@
           <a:p>
             <a:fld id="{6DBF160B-3A44-4C3B-BCEA-BD19AB6803E9}" type="datetime1">
               <a:rPr lang="en-US" smtClean="0"/>
-              <a:t>1/29/25</a:t>
+              <a:t>2/4/25</a:t>
             </a:fld>
             <a:endParaRPr lang="en-US"/>
           </a:p>
@@ -2150,7 +2150,7 @@
           <a:p>
             <a:fld id="{C764DE79-268F-4C1A-8933-263129D2AF90}" type="datetimeFigureOut">
               <a:rPr lang="en-US" dirty="0"/>
-              <a:t>1/29/25</a:t>
+              <a:t>2/4/25</a:t>
             </a:fld>
             <a:endParaRPr lang="en-US" dirty="0"/>
           </a:p>
@@ -2331,7 +2331,7 @@
           <a:p>
             <a:fld id="{C764DE79-268F-4C1A-8933-263129D2AF90}" type="datetimeFigureOut">
               <a:rPr lang="en-US" dirty="0"/>
-              <a:t>1/29/25</a:t>
+              <a:t>2/4/25</a:t>
             </a:fld>
             <a:endParaRPr lang="en-US" dirty="0"/>
           </a:p>
@@ -2617,7 +2617,7 @@
           <a:p>
             <a:fld id="{9A38245A-2362-40A2-9432-11E173A2FE35}" type="datetime1">
               <a:rPr lang="en-US" smtClean="0"/>
-              <a:t>1/29/25</a:t>
+              <a:t>2/4/25</a:t>
             </a:fld>
             <a:endParaRPr lang="en-US"/>
           </a:p>
@@ -2926,7 +2926,7 @@
           <a:p>
             <a:fld id="{6FB96879-471E-46C8-A813-F70B84DA637C}" type="datetime1">
               <a:rPr lang="en-US" smtClean="0"/>
-              <a:t>1/29/25</a:t>
+              <a:t>2/4/25</a:t>
             </a:fld>
             <a:endParaRPr lang="en-US"/>
           </a:p>
@@ -3265,7 +3265,7 @@
           <a:p>
             <a:fld id="{81A389D0-0F06-4052-931B-BC5D7EEFC8E9}" type="datetime1">
               <a:rPr lang="en-US" smtClean="0"/>
-              <a:t>1/29/25</a:t>
+              <a:t>2/4/25</a:t>
             </a:fld>
             <a:endParaRPr lang="en-US"/>
           </a:p>
@@ -3489,7 +3489,7 @@
           <a:p>
             <a:fld id="{FA8505E0-37E7-4BCD-BA8D-3C81CE89C100}" type="datetime1">
               <a:rPr lang="en-US" smtClean="0"/>
-              <a:t>1/29/25</a:t>
+              <a:t>2/4/25</a:t>
             </a:fld>
             <a:endParaRPr lang="en-US"/>
           </a:p>
@@ -3736,7 +3736,7 @@
           <a:p>
             <a:fld id="{C764DE79-268F-4C1A-8933-263129D2AF90}" type="datetimeFigureOut">
               <a:rPr lang="en-US" dirty="0"/>
-              <a:t>1/29/25</a:t>
+              <a:t>2/4/25</a:t>
             </a:fld>
             <a:endParaRPr lang="en-US" dirty="0"/>
           </a:p>
@@ -3969,7 +3969,7 @@
           <a:p>
             <a:fld id="{9A38245A-2362-40A2-9432-11E173A2FE35}" type="datetime1">
               <a:rPr lang="en-US" smtClean="0"/>
-              <a:t>1/29/25</a:t>
+              <a:t>2/4/25</a:t>
             </a:fld>
             <a:endParaRPr lang="en-US"/>
           </a:p>
@@ -4336,7 +4336,7 @@
           <a:p>
             <a:fld id="{C764DE79-268F-4C1A-8933-263129D2AF90}" type="datetimeFigureOut">
               <a:rPr lang="en-US" dirty="0"/>
-              <a:t>1/29/25</a:t>
+              <a:t>2/4/25</a:t>
             </a:fld>
             <a:endParaRPr lang="en-US" dirty="0"/>
           </a:p>
@@ -4455,7 +4455,7 @@
           <a:p>
             <a:fld id="{81A389D0-0F06-4052-931B-BC5D7EEFC8E9}" type="datetime1">
               <a:rPr lang="en-US" smtClean="0"/>
-              <a:t>1/29/25</a:t>
+              <a:t>2/4/25</a:t>
             </a:fld>
             <a:endParaRPr lang="en-US"/>
           </a:p>
@@ -4550,7 +4550,7 @@
           <a:p>
             <a:fld id="{5ECBC4FA-4788-483E-AD3A-36A4714E3E4D}" type="datetime1">
               <a:rPr lang="en-US" smtClean="0"/>
-              <a:t>1/29/25</a:t>
+              <a:t>2/4/25</a:t>
             </a:fld>
             <a:endParaRPr lang="en-US"/>
           </a:p>
@@ -4827,7 +4827,7 @@
           <a:p>
             <a:fld id="{C764DE79-268F-4C1A-8933-263129D2AF90}" type="datetimeFigureOut">
               <a:rPr lang="en-US" dirty="0"/>
-              <a:t>1/29/25</a:t>
+              <a:t>2/4/25</a:t>
             </a:fld>
             <a:endParaRPr lang="en-US" dirty="0"/>
           </a:p>
@@ -5085,7 +5085,7 @@
           <a:p>
             <a:fld id="{C764DE79-268F-4C1A-8933-263129D2AF90}" type="datetimeFigureOut">
               <a:rPr lang="en-US" dirty="0"/>
-              <a:t>1/29/25</a:t>
+              <a:t>2/4/25</a:t>
             </a:fld>
             <a:endParaRPr lang="en-US" dirty="0"/>
           </a:p>
@@ -5299,7 +5299,7 @@
           <a:p>
             <a:fld id="{C764DE79-268F-4C1A-8933-263129D2AF90}" type="datetimeFigureOut">
               <a:rPr lang="en-US" dirty="0"/>
-              <a:t>1/29/25</a:t>
+              <a:t>2/4/25</a:t>
             </a:fld>
             <a:endParaRPr lang="en-US" dirty="0"/>
           </a:p>
@@ -24702,8 +24702,9 @@
             </a:avLst>
           </a:prstGeom>
           <a:solidFill>
-            <a:schemeClr val="bg1">
-              <a:lumMod val="85000"/>
+            <a:schemeClr val="accent1">
+              <a:lumMod val="20000"/>
+              <a:lumOff val="80000"/>
             </a:schemeClr>
           </a:solidFill>
           <a:ln>
@@ -24917,8 +24918,8 @@
         </p:nvSpPr>
         <p:spPr>
           <a:xfrm>
-            <a:off x="3366489" y="4600100"/>
-            <a:ext cx="1858696" cy="633285"/>
+            <a:off x="3366490" y="4600100"/>
+            <a:ext cx="1858695" cy="633285"/>
           </a:xfrm>
           <a:prstGeom prst="roundRect">
             <a:avLst/>
@@ -24954,7 +24955,7 @@
           </a:fontRef>
         </p:style>
         <p:txBody>
-          <a:bodyPr rtlCol="0" anchor="t"/>
+          <a:bodyPr lIns="36000" rIns="36000" rtlCol="0" anchor="t"/>
           <a:lstStyle/>
           <a:p>
             <a:pPr algn="ctr"/>
@@ -24964,7 +24965,7 @@
                   <a:schemeClr val="tx1"/>
                 </a:solidFill>
               </a:rPr>
-              <a:t>UNTP Extension WG</a:t>
+              <a:t>Community Extension WG</a:t>
             </a:r>
           </a:p>
           <a:p>
@@ -25910,7 +25911,7 @@
         <p:spPr>
           <a:xfrm>
             <a:off x="5095850" y="3062073"/>
-            <a:ext cx="978617" cy="398525"/>
+            <a:ext cx="978617" cy="430887"/>
           </a:xfrm>
           <a:prstGeom prst="rect">
             <a:avLst/>
@@ -25926,7 +25927,7 @@
             <a:pPr algn="r"/>
             <a:r>
               <a:rPr lang="en-AU" sz="1100" dirty="0"/>
-              <a:t>Approve release of</a:t>
+              <a:t>Approves release of</a:t>
             </a:r>
           </a:p>
         </p:txBody>
@@ -25946,7 +25947,7 @@
         <p:spPr>
           <a:xfrm>
             <a:off x="5347693" y="4960603"/>
-            <a:ext cx="798303" cy="398525"/>
+            <a:ext cx="798303" cy="430887"/>
           </a:xfrm>
           <a:prstGeom prst="rect">
             <a:avLst/>
@@ -25962,7 +25963,7 @@
             <a:pPr algn="r"/>
             <a:r>
               <a:rPr lang="en-AU" sz="1100" dirty="0"/>
-              <a:t>Approve release of</a:t>
+              <a:t>Approves release of</a:t>
             </a:r>
           </a:p>
         </p:txBody>
@@ -26179,8 +26180,8 @@
         </p:nvSpPr>
         <p:spPr>
           <a:xfrm>
-            <a:off x="5918748" y="2366506"/>
-            <a:ext cx="2911722" cy="256195"/>
+            <a:off x="5445870" y="2342891"/>
+            <a:ext cx="3357145" cy="307777"/>
           </a:xfrm>
           <a:prstGeom prst="rect">
             <a:avLst/>
@@ -26195,8 +26196,8 @@
           <a:p>
             <a:pPr algn="r"/>
             <a:r>
-              <a:rPr lang="en-AU" sz="1200" b="1" dirty="0"/>
-              <a:t>UN Governed, slower moving foundational</a:t>
+              <a:rPr lang="en-AU" sz="1400" b="1" dirty="0"/>
+              <a:t>UNTP Core, UN Governed, foundational</a:t>
             </a:r>
           </a:p>
         </p:txBody>
@@ -26215,8 +26216,8 @@
         </p:nvSpPr>
         <p:spPr>
           <a:xfrm>
-            <a:off x="5381759" y="6028447"/>
-            <a:ext cx="3230668" cy="256195"/>
+            <a:off x="4182625" y="5976865"/>
+            <a:ext cx="4453227" cy="307777"/>
           </a:xfrm>
           <a:prstGeom prst="rect">
             <a:avLst/>
@@ -26231,8 +26232,8 @@
           <a:p>
             <a:pPr algn="r"/>
             <a:r>
-              <a:rPr lang="en-AU" sz="1200" b="1" dirty="0"/>
-              <a:t>Community governed, faster moving responsive</a:t>
+              <a:rPr lang="en-AU" sz="1400" b="1" dirty="0"/>
+              <a:t>Industry extensions, Community governed, responsive</a:t>
             </a:r>
           </a:p>
         </p:txBody>
@@ -26331,8 +26332,8 @@
         </p:nvSpPr>
         <p:spPr>
           <a:xfrm>
-            <a:off x="4917858" y="4153354"/>
-            <a:ext cx="1501095" cy="241961"/>
+            <a:off x="5012331" y="4326648"/>
+            <a:ext cx="1466412" cy="261610"/>
           </a:xfrm>
           <a:prstGeom prst="rect">
             <a:avLst/>

</xml_diff>

<commit_message>
Update to add UNTP Extensions Governance Board
</commit_message>
<xml_diff>
--- a/website/docs/about/UNTP-Diagrams-About.pptx
+++ b/website/docs/about/UNTP-Diagrams-About.pptx
@@ -246,7 +246,7 @@
           <a:p>
             <a:fld id="{147FDE8E-C9EA-4A43-8789-DFF19C510078}" type="datetimeFigureOut">
               <a:rPr lang="en-US" smtClean="0"/>
-              <a:t>2/4/25</a:t>
+              <a:t>3/20/25</a:t>
             </a:fld>
             <a:endParaRPr lang="en-US"/>
           </a:p>
@@ -1825,7 +1825,7 @@
           <a:p>
             <a:fld id="{6DBF160B-3A44-4C3B-BCEA-BD19AB6803E9}" type="datetime1">
               <a:rPr lang="en-US" smtClean="0"/>
-              <a:t>2/4/25</a:t>
+              <a:t>3/20/25</a:t>
             </a:fld>
             <a:endParaRPr lang="en-US"/>
           </a:p>
@@ -2150,7 +2150,7 @@
           <a:p>
             <a:fld id="{C764DE79-268F-4C1A-8933-263129D2AF90}" type="datetimeFigureOut">
               <a:rPr lang="en-US" dirty="0"/>
-              <a:t>2/4/25</a:t>
+              <a:t>3/20/25</a:t>
             </a:fld>
             <a:endParaRPr lang="en-US" dirty="0"/>
           </a:p>
@@ -2331,7 +2331,7 @@
           <a:p>
             <a:fld id="{C764DE79-268F-4C1A-8933-263129D2AF90}" type="datetimeFigureOut">
               <a:rPr lang="en-US" dirty="0"/>
-              <a:t>2/4/25</a:t>
+              <a:t>3/20/25</a:t>
             </a:fld>
             <a:endParaRPr lang="en-US" dirty="0"/>
           </a:p>
@@ -2617,7 +2617,7 @@
           <a:p>
             <a:fld id="{9A38245A-2362-40A2-9432-11E173A2FE35}" type="datetime1">
               <a:rPr lang="en-US" smtClean="0"/>
-              <a:t>2/4/25</a:t>
+              <a:t>3/20/25</a:t>
             </a:fld>
             <a:endParaRPr lang="en-US"/>
           </a:p>
@@ -2926,7 +2926,7 @@
           <a:p>
             <a:fld id="{6FB96879-471E-46C8-A813-F70B84DA637C}" type="datetime1">
               <a:rPr lang="en-US" smtClean="0"/>
-              <a:t>2/4/25</a:t>
+              <a:t>3/20/25</a:t>
             </a:fld>
             <a:endParaRPr lang="en-US"/>
           </a:p>
@@ -3265,7 +3265,7 @@
           <a:p>
             <a:fld id="{81A389D0-0F06-4052-931B-BC5D7EEFC8E9}" type="datetime1">
               <a:rPr lang="en-US" smtClean="0"/>
-              <a:t>2/4/25</a:t>
+              <a:t>3/20/25</a:t>
             </a:fld>
             <a:endParaRPr lang="en-US"/>
           </a:p>
@@ -3489,7 +3489,7 @@
           <a:p>
             <a:fld id="{FA8505E0-37E7-4BCD-BA8D-3C81CE89C100}" type="datetime1">
               <a:rPr lang="en-US" smtClean="0"/>
-              <a:t>2/4/25</a:t>
+              <a:t>3/20/25</a:t>
             </a:fld>
             <a:endParaRPr lang="en-US"/>
           </a:p>
@@ -3736,7 +3736,7 @@
           <a:p>
             <a:fld id="{C764DE79-268F-4C1A-8933-263129D2AF90}" type="datetimeFigureOut">
               <a:rPr lang="en-US" dirty="0"/>
-              <a:t>2/4/25</a:t>
+              <a:t>3/20/25</a:t>
             </a:fld>
             <a:endParaRPr lang="en-US" dirty="0"/>
           </a:p>
@@ -3969,7 +3969,7 @@
           <a:p>
             <a:fld id="{9A38245A-2362-40A2-9432-11E173A2FE35}" type="datetime1">
               <a:rPr lang="en-US" smtClean="0"/>
-              <a:t>2/4/25</a:t>
+              <a:t>3/20/25</a:t>
             </a:fld>
             <a:endParaRPr lang="en-US"/>
           </a:p>
@@ -4336,7 +4336,7 @@
           <a:p>
             <a:fld id="{C764DE79-268F-4C1A-8933-263129D2AF90}" type="datetimeFigureOut">
               <a:rPr lang="en-US" dirty="0"/>
-              <a:t>2/4/25</a:t>
+              <a:t>3/20/25</a:t>
             </a:fld>
             <a:endParaRPr lang="en-US" dirty="0"/>
           </a:p>
@@ -4455,7 +4455,7 @@
           <a:p>
             <a:fld id="{81A389D0-0F06-4052-931B-BC5D7EEFC8E9}" type="datetime1">
               <a:rPr lang="en-US" smtClean="0"/>
-              <a:t>2/4/25</a:t>
+              <a:t>3/20/25</a:t>
             </a:fld>
             <a:endParaRPr lang="en-US"/>
           </a:p>
@@ -4550,7 +4550,7 @@
           <a:p>
             <a:fld id="{5ECBC4FA-4788-483E-AD3A-36A4714E3E4D}" type="datetime1">
               <a:rPr lang="en-US" smtClean="0"/>
-              <a:t>2/4/25</a:t>
+              <a:t>3/20/25</a:t>
             </a:fld>
             <a:endParaRPr lang="en-US"/>
           </a:p>
@@ -4827,7 +4827,7 @@
           <a:p>
             <a:fld id="{C764DE79-268F-4C1A-8933-263129D2AF90}" type="datetimeFigureOut">
               <a:rPr lang="en-US" dirty="0"/>
-              <a:t>2/4/25</a:t>
+              <a:t>3/20/25</a:t>
             </a:fld>
             <a:endParaRPr lang="en-US" dirty="0"/>
           </a:p>
@@ -5085,7 +5085,7 @@
           <a:p>
             <a:fld id="{C764DE79-268F-4C1A-8933-263129D2AF90}" type="datetimeFigureOut">
               <a:rPr lang="en-US" dirty="0"/>
-              <a:t>2/4/25</a:t>
+              <a:t>3/20/25</a:t>
             </a:fld>
             <a:endParaRPr lang="en-US" dirty="0"/>
           </a:p>
@@ -5299,7 +5299,7 @@
           <a:p>
             <a:fld id="{C764DE79-268F-4C1A-8933-263129D2AF90}" type="datetimeFigureOut">
               <a:rPr lang="en-US" dirty="0"/>
-              <a:t>2/4/25</a:t>
+              <a:t>3/20/25</a:t>
             </a:fld>
             <a:endParaRPr lang="en-US" dirty="0"/>
           </a:p>
@@ -25096,7 +25096,7 @@
         </p:nvSpPr>
         <p:spPr>
           <a:xfrm>
-            <a:off x="156567" y="1436278"/>
+            <a:off x="406028" y="281255"/>
             <a:ext cx="2022495" cy="633285"/>
           </a:xfrm>
           <a:prstGeom prst="roundRect">
@@ -25712,9 +25712,9 @@
           <p:nvPr/>
         </p:nvCxnSpPr>
         <p:spPr>
-          <a:xfrm rot="16200000" flipH="1">
-            <a:off x="1942534" y="1325550"/>
-            <a:ext cx="660920" cy="2210359"/>
+          <a:xfrm>
+            <a:off x="2441044" y="597898"/>
+            <a:ext cx="1251085" cy="574697"/>
           </a:xfrm>
           <a:prstGeom prst="bentConnector2">
             <a:avLst/>
@@ -25836,7 +25836,7 @@
         </p:nvSpPr>
         <p:spPr>
           <a:xfrm>
-            <a:off x="1488817" y="2558114"/>
+            <a:off x="2496427" y="344362"/>
             <a:ext cx="1071900" cy="216909"/>
           </a:xfrm>
           <a:prstGeom prst="rect">
@@ -25875,8 +25875,8 @@
         </p:nvSpPr>
         <p:spPr>
           <a:xfrm>
-            <a:off x="3343085" y="1968289"/>
-            <a:ext cx="582745" cy="216909"/>
+            <a:off x="3009517" y="1932310"/>
+            <a:ext cx="952681" cy="430887"/>
           </a:xfrm>
           <a:prstGeom prst="rect">
             <a:avLst/>
@@ -25884,14 +25884,15 @@
           <a:noFill/>
         </p:spPr>
         <p:txBody>
-          <a:bodyPr wrap="none" rtlCol="0">
+          <a:bodyPr wrap="square" rtlCol="0">
             <a:spAutoFit/>
           </a:bodyPr>
           <a:lstStyle/>
           <a:p>
+            <a:pPr algn="r"/>
             <a:r>
               <a:rPr lang="en-AU" sz="1100" dirty="0"/>
-              <a:t>Governs</a:t>
+              <a:t>Governs processes of </a:t>
             </a:r>
           </a:p>
         </p:txBody>
@@ -26101,11 +26102,11 @@
           <p:nvPr/>
         </p:nvCxnSpPr>
         <p:spPr>
-          <a:xfrm rot="5400000" flipH="1" flipV="1">
-            <a:off x="1959969" y="2309841"/>
-            <a:ext cx="626056" cy="2210355"/>
-          </a:xfrm>
-          <a:prstGeom prst="bentConnector2">
+          <a:xfrm flipV="1">
+            <a:off x="875763" y="2257136"/>
+            <a:ext cx="0" cy="1458776"/>
+          </a:xfrm>
+          <a:prstGeom prst="straightConnector1">
             <a:avLst/>
           </a:prstGeom>
           <a:ln w="19050">
@@ -26145,8 +26146,8 @@
         </p:nvSpPr>
         <p:spPr>
           <a:xfrm>
-            <a:off x="1475414" y="2918900"/>
-            <a:ext cx="1407295" cy="216909"/>
+            <a:off x="867180" y="3111215"/>
+            <a:ext cx="953109" cy="430887"/>
           </a:xfrm>
           <a:prstGeom prst="rect">
             <a:avLst/>
@@ -26253,7 +26254,7 @@
         <p:spPr>
           <a:xfrm>
             <a:off x="2155188" y="3891597"/>
-            <a:ext cx="745718" cy="216909"/>
+            <a:ext cx="745718" cy="261610"/>
           </a:xfrm>
           <a:prstGeom prst="rect">
             <a:avLst/>
@@ -27970,8 +27971,8 @@
         </p:nvCxnSpPr>
         <p:spPr>
           <a:xfrm rot="10800000" flipV="1">
-            <a:off x="3764518" y="403455"/>
-            <a:ext cx="2644721" cy="778850"/>
+            <a:off x="4048611" y="403455"/>
+            <a:ext cx="2363904" cy="769140"/>
           </a:xfrm>
           <a:prstGeom prst="bentConnector2">
             <a:avLst/>
@@ -28093,7 +28094,7 @@
         </p:nvSpPr>
         <p:spPr>
           <a:xfrm>
-            <a:off x="4006366" y="191108"/>
+            <a:off x="4064241" y="191108"/>
             <a:ext cx="2281054" cy="446276"/>
           </a:xfrm>
           <a:prstGeom prst="rect">
@@ -28499,6 +28500,260 @@
             <a:r>
               <a:rPr lang="en-AU" sz="1100" i="1" dirty="0"/>
               <a:t>Improved compliance &amp; due diligence</a:t>
+            </a:r>
+          </a:p>
+        </p:txBody>
+      </p:sp>
+      <p:sp>
+        <p:nvSpPr>
+          <p:cNvPr id="10" name="Rounded Rectangle 9">
+            <a:extLst>
+              <a:ext uri="{FF2B5EF4-FFF2-40B4-BE49-F238E27FC236}">
+                <a16:creationId xmlns:a16="http://schemas.microsoft.com/office/drawing/2014/main" id="{7E7D95A4-E730-B8EB-EAEC-8A8610C93ADB}"/>
+              </a:ext>
+            </a:extLst>
+          </p:cNvPr>
+          <p:cNvSpPr/>
+          <p:nvPr/>
+        </p:nvSpPr>
+        <p:spPr>
+          <a:xfrm>
+            <a:off x="370638" y="1334042"/>
+            <a:ext cx="2090399" cy="886163"/>
+          </a:xfrm>
+          <a:prstGeom prst="roundRect">
+            <a:avLst/>
+          </a:prstGeom>
+          <a:solidFill>
+            <a:schemeClr val="accent5">
+              <a:lumMod val="20000"/>
+              <a:lumOff val="80000"/>
+            </a:schemeClr>
+          </a:solidFill>
+          <a:ln w="38100">
+            <a:solidFill>
+              <a:schemeClr val="accent1"/>
+            </a:solidFill>
+          </a:ln>
+          <a:effectLst>
+            <a:outerShdw blurRad="50800" dist="38100" dir="2700000" algn="tl" rotWithShape="0">
+              <a:prstClr val="black">
+                <a:alpha val="40000"/>
+              </a:prstClr>
+            </a:outerShdw>
+          </a:effectLst>
+        </p:spPr>
+        <p:style>
+          <a:lnRef idx="2">
+            <a:schemeClr val="accent1">
+              <a:shade val="15000"/>
+            </a:schemeClr>
+          </a:lnRef>
+          <a:fillRef idx="1">
+            <a:schemeClr val="accent1"/>
+          </a:fillRef>
+          <a:effectRef idx="0">
+            <a:schemeClr val="accent1"/>
+          </a:effectRef>
+          <a:fontRef idx="minor">
+            <a:schemeClr val="lt1"/>
+          </a:fontRef>
+        </p:style>
+        <p:txBody>
+          <a:bodyPr lIns="36000" rIns="36000" rtlCol="0" anchor="t"/>
+          <a:lstStyle/>
+          <a:p>
+            <a:pPr algn="ctr"/>
+            <a:r>
+              <a:rPr lang="en-AU" sz="1200" b="1" dirty="0">
+                <a:solidFill>
+                  <a:schemeClr val="tx1"/>
+                </a:solidFill>
+              </a:rPr>
+              <a:t>Extensions Governance Board</a:t>
+            </a:r>
+          </a:p>
+          <a:p>
+            <a:pPr algn="ctr"/>
+            <a:r>
+              <a:rPr lang="en-AU" sz="1100" i="1" dirty="0">
+                <a:solidFill>
+                  <a:schemeClr val="tx1"/>
+                </a:solidFill>
+              </a:rPr>
+              <a:t>Secretariat support</a:t>
+            </a:r>
+          </a:p>
+          <a:p>
+            <a:pPr algn="ctr"/>
+            <a:r>
+              <a:rPr lang="en-AU" sz="1100" i="1" dirty="0">
+                <a:solidFill>
+                  <a:schemeClr val="tx1"/>
+                </a:solidFill>
+              </a:rPr>
+              <a:t>Board chair and members drawn from extension owners</a:t>
+            </a:r>
+          </a:p>
+        </p:txBody>
+      </p:sp>
+      <p:cxnSp>
+        <p:nvCxnSpPr>
+          <p:cNvPr id="15" name="Straight Arrow Connector 15">
+            <a:extLst>
+              <a:ext uri="{FF2B5EF4-FFF2-40B4-BE49-F238E27FC236}">
+                <a16:creationId xmlns:a16="http://schemas.microsoft.com/office/drawing/2014/main" id="{D1A740D8-EB99-F99C-DB63-E662EF37A772}"/>
+              </a:ext>
+            </a:extLst>
+          </p:cNvPr>
+          <p:cNvCxnSpPr>
+            <a:cxnSpLocks/>
+          </p:cNvCxnSpPr>
+          <p:nvPr/>
+        </p:nvCxnSpPr>
+        <p:spPr>
+          <a:xfrm rot="16200000" flipH="1">
+            <a:off x="2122178" y="1721387"/>
+            <a:ext cx="715886" cy="1739837"/>
+          </a:xfrm>
+          <a:prstGeom prst="bentConnector2">
+            <a:avLst/>
+          </a:prstGeom>
+          <a:ln w="19050">
+            <a:solidFill>
+              <a:schemeClr val="tx1"/>
+            </a:solidFill>
+            <a:headEnd type="none" w="med" len="med"/>
+            <a:tailEnd type="arrow" w="med" len="med"/>
+          </a:ln>
+        </p:spPr>
+        <p:style>
+          <a:lnRef idx="1">
+            <a:schemeClr val="accent1"/>
+          </a:lnRef>
+          <a:fillRef idx="0">
+            <a:schemeClr val="accent1"/>
+          </a:fillRef>
+          <a:effectRef idx="0">
+            <a:schemeClr val="accent1"/>
+          </a:effectRef>
+          <a:fontRef idx="minor">
+            <a:schemeClr val="tx1"/>
+          </a:fontRef>
+        </p:style>
+      </p:cxnSp>
+      <p:sp>
+        <p:nvSpPr>
+          <p:cNvPr id="20" name="TextBox 19">
+            <a:extLst>
+              <a:ext uri="{FF2B5EF4-FFF2-40B4-BE49-F238E27FC236}">
+                <a16:creationId xmlns:a16="http://schemas.microsoft.com/office/drawing/2014/main" id="{B910F4FD-5437-F9BF-8661-65D619D09A1F}"/>
+              </a:ext>
+            </a:extLst>
+          </p:cNvPr>
+          <p:cNvSpPr txBox="1"/>
+          <p:nvPr/>
+        </p:nvSpPr>
+        <p:spPr>
+          <a:xfrm>
+            <a:off x="1588124" y="2298615"/>
+            <a:ext cx="1204448" cy="600164"/>
+          </a:xfrm>
+          <a:prstGeom prst="rect">
+            <a:avLst/>
+          </a:prstGeom>
+          <a:noFill/>
+        </p:spPr>
+        <p:txBody>
+          <a:bodyPr wrap="square" rtlCol="0">
+            <a:spAutoFit/>
+          </a:bodyPr>
+          <a:lstStyle/>
+          <a:p>
+            <a:r>
+              <a:rPr lang="en-AU" sz="1100" dirty="0"/>
+              <a:t>Governs requirements &amp; roadmap of</a:t>
+            </a:r>
+          </a:p>
+        </p:txBody>
+      </p:sp>
+      <p:cxnSp>
+        <p:nvCxnSpPr>
+          <p:cNvPr id="21" name="Straight Arrow Connector 15">
+            <a:extLst>
+              <a:ext uri="{FF2B5EF4-FFF2-40B4-BE49-F238E27FC236}">
+                <a16:creationId xmlns:a16="http://schemas.microsoft.com/office/drawing/2014/main" id="{18158C3F-D090-8488-0F3A-4A8ECEFB0C82}"/>
+              </a:ext>
+            </a:extLst>
+          </p:cNvPr>
+          <p:cNvCxnSpPr>
+            <a:cxnSpLocks/>
+          </p:cNvCxnSpPr>
+          <p:nvPr/>
+        </p:nvCxnSpPr>
+        <p:spPr>
+          <a:xfrm flipH="1">
+            <a:off x="2441241" y="1711454"/>
+            <a:ext cx="853144" cy="0"/>
+          </a:xfrm>
+          <a:prstGeom prst="straightConnector1">
+            <a:avLst/>
+          </a:prstGeom>
+          <a:ln w="19050">
+            <a:solidFill>
+              <a:schemeClr val="tx1"/>
+            </a:solidFill>
+            <a:headEnd type="none" w="med" len="med"/>
+            <a:tailEnd type="arrow" w="med" len="med"/>
+          </a:ln>
+        </p:spPr>
+        <p:style>
+          <a:lnRef idx="1">
+            <a:schemeClr val="accent1"/>
+          </a:lnRef>
+          <a:fillRef idx="0">
+            <a:schemeClr val="accent1"/>
+          </a:fillRef>
+          <a:effectRef idx="0">
+            <a:schemeClr val="accent1"/>
+          </a:effectRef>
+          <a:fontRef idx="minor">
+            <a:schemeClr val="tx1"/>
+          </a:fontRef>
+        </p:style>
+      </p:cxnSp>
+      <p:sp>
+        <p:nvSpPr>
+          <p:cNvPr id="27" name="TextBox 26">
+            <a:extLst>
+              <a:ext uri="{FF2B5EF4-FFF2-40B4-BE49-F238E27FC236}">
+                <a16:creationId xmlns:a16="http://schemas.microsoft.com/office/drawing/2014/main" id="{727D5F9C-5070-4616-C341-7956711AB151}"/>
+              </a:ext>
+            </a:extLst>
+          </p:cNvPr>
+          <p:cNvSpPr txBox="1"/>
+          <p:nvPr/>
+        </p:nvSpPr>
+        <p:spPr>
+          <a:xfrm>
+            <a:off x="2442813" y="1463480"/>
+            <a:ext cx="772259" cy="261610"/>
+          </a:xfrm>
+          <a:prstGeom prst="rect">
+            <a:avLst/>
+          </a:prstGeom>
+          <a:noFill/>
+        </p:spPr>
+        <p:txBody>
+          <a:bodyPr wrap="square" rtlCol="0">
+            <a:spAutoFit/>
+          </a:bodyPr>
+          <a:lstStyle/>
+          <a:p>
+            <a:pPr algn="r"/>
+            <a:r>
+              <a:rPr lang="en-AU" sz="1100" dirty="0"/>
+              <a:t>supports</a:t>
             </a:r>
           </a:p>
         </p:txBody>

</xml_diff>